<commit_message>
Actualizado el power point con una diapositiva de conclusión
</commit_message>
<xml_diff>
--- a/Análisis Exploratorio de demoras en vuelos de aerolíneas.pptx
+++ b/Análisis Exploratorio de demoras en vuelos de aerolíneas.pptx
@@ -17,6 +17,7 @@
     <p:sldId id="268" r:id="rId11"/>
     <p:sldId id="270" r:id="rId12"/>
     <p:sldId id="269" r:id="rId13"/>
+    <p:sldId id="271" r:id="rId14"/>
   </p:sldIdLst>
   <p:sldSz cx="12192000" cy="6858000"/>
   <p:notesSz cx="6858000" cy="9144000"/>
@@ -7054,6 +7055,190 @@
 </p:sld>
 </file>
 
+<file path=ppt/slides/slide13.xml><?xml version="1.0" encoding="utf-8"?>
+<p:sld xmlns:a="http://schemas.openxmlformats.org/drawingml/2006/main" xmlns:r="http://schemas.openxmlformats.org/officeDocument/2006/relationships" xmlns:p="http://schemas.openxmlformats.org/presentationml/2006/main">
+  <p:cSld>
+    <p:spTree>
+      <p:nvGrpSpPr>
+        <p:cNvPr id="1" name=""/>
+        <p:cNvGrpSpPr/>
+        <p:nvPr/>
+      </p:nvGrpSpPr>
+      <p:grpSpPr>
+        <a:xfrm>
+          <a:off x="0" y="0"/>
+          <a:ext cx="0" cy="0"/>
+          <a:chOff x="0" y="0"/>
+          <a:chExt cx="0" cy="0"/>
+        </a:xfrm>
+      </p:grpSpPr>
+      <p:sp>
+        <p:nvSpPr>
+          <p:cNvPr id="2" name="Título 1">
+            <a:extLst>
+              <a:ext uri="{FF2B5EF4-FFF2-40B4-BE49-F238E27FC236}">
+                <a16:creationId xmlns:a16="http://schemas.microsoft.com/office/drawing/2014/main" id="{A960042F-0DE8-9C77-5709-A017AB9A3652}"/>
+              </a:ext>
+            </a:extLst>
+          </p:cNvPr>
+          <p:cNvSpPr>
+            <a:spLocks noGrp="1"/>
+          </p:cNvSpPr>
+          <p:nvPr>
+            <p:ph type="title"/>
+          </p:nvPr>
+        </p:nvSpPr>
+        <p:spPr/>
+        <p:txBody>
+          <a:bodyPr/>
+          <a:lstStyle/>
+          <a:p>
+            <a:r>
+              <a:rPr lang="es-MX" dirty="0"/>
+              <a:t>Conclusión</a:t>
+            </a:r>
+            <a:endParaRPr lang="es-AR" dirty="0"/>
+          </a:p>
+        </p:txBody>
+      </p:sp>
+      <p:sp>
+        <p:nvSpPr>
+          <p:cNvPr id="3" name="Marcador de contenido 2">
+            <a:extLst>
+              <a:ext uri="{FF2B5EF4-FFF2-40B4-BE49-F238E27FC236}">
+                <a16:creationId xmlns:a16="http://schemas.microsoft.com/office/drawing/2014/main" id="{00FF3B16-4890-942F-547F-868D299FBE75}"/>
+              </a:ext>
+            </a:extLst>
+          </p:cNvPr>
+          <p:cNvSpPr>
+            <a:spLocks noGrp="1"/>
+          </p:cNvSpPr>
+          <p:nvPr>
+            <p:ph idx="1"/>
+          </p:nvPr>
+        </p:nvSpPr>
+        <p:spPr/>
+        <p:txBody>
+          <a:bodyPr>
+            <a:normAutofit/>
+          </a:bodyPr>
+          <a:lstStyle/>
+          <a:p>
+            <a:r>
+              <a:rPr lang="es-AR" dirty="0"/>
+              <a:t>Puede comprenderse la composición y clasificación de los vuelos y las demoras.</a:t>
+            </a:r>
+          </a:p>
+          <a:p>
+            <a:r>
+              <a:rPr lang="es-AR" dirty="0"/>
+              <a:t>Pueden observarse:</a:t>
+            </a:r>
+          </a:p>
+          <a:p>
+            <a:pPr lvl="1"/>
+            <a:r>
+              <a:rPr lang="es-AR" dirty="0"/>
+              <a:t>Presencia y efectos de eventos extraordinarios (como la pandemia de Covid-19).</a:t>
+            </a:r>
+          </a:p>
+          <a:p>
+            <a:pPr lvl="1"/>
+            <a:r>
+              <a:rPr lang="es-AR" dirty="0"/>
+              <a:t>Fluctuaciones estacionarias en el tiempo.</a:t>
+            </a:r>
+          </a:p>
+          <a:p>
+            <a:pPr lvl="1"/>
+            <a:r>
+              <a:rPr lang="es-AR" dirty="0"/>
+              <a:t>Posibilidades de ocurrencia de demoras.</a:t>
+            </a:r>
+          </a:p>
+          <a:p>
+            <a:r>
+              <a:rPr lang="es-AR" dirty="0"/>
+              <a:t>Se lograron desarrollar cinco distintos modelos de regresión.</a:t>
+            </a:r>
+          </a:p>
+          <a:p>
+            <a:pPr lvl="1"/>
+            <a:r>
+              <a:rPr lang="es-AR" dirty="0"/>
+              <a:t>Modelo más eficiente: </a:t>
+            </a:r>
+            <a:r>
+              <a:rPr lang="es-AR" dirty="0" err="1"/>
+              <a:t>Random</a:t>
+            </a:r>
+            <a:r>
+              <a:rPr lang="es-AR"/>
+              <a:t> Forest </a:t>
+            </a:r>
+            <a:r>
+              <a:rPr lang="es-AR" dirty="0"/>
+              <a:t>2 de la primera ronda de análisis.</a:t>
+            </a:r>
+          </a:p>
+          <a:p>
+            <a:r>
+              <a:rPr lang="es-AR" dirty="0"/>
+              <a:t>Posibilidades a futuro:</a:t>
+            </a:r>
+          </a:p>
+          <a:p>
+            <a:pPr lvl="1"/>
+            <a:r>
+              <a:rPr lang="es-AR" dirty="0"/>
+              <a:t>Predicciones de demoras por aeropuerto, </a:t>
+            </a:r>
+            <a:r>
+              <a:rPr lang="es-AR" dirty="0" err="1"/>
+              <a:t>carrier</a:t>
+            </a:r>
+            <a:r>
+              <a:rPr lang="es-AR" dirty="0"/>
+              <a:t> u otras clasificaciones.</a:t>
+            </a:r>
+          </a:p>
+          <a:p>
+            <a:pPr lvl="1"/>
+            <a:r>
+              <a:rPr lang="es-AR" dirty="0"/>
+              <a:t>Análisis comparativos entre los distintos </a:t>
+            </a:r>
+            <a:r>
+              <a:rPr lang="es-AR" dirty="0" err="1"/>
+              <a:t>carriers</a:t>
+            </a:r>
+            <a:r>
+              <a:rPr lang="es-AR" dirty="0"/>
+              <a:t> y aeropuertos.</a:t>
+            </a:r>
+          </a:p>
+          <a:p>
+            <a:pPr lvl="1"/>
+            <a:r>
+              <a:rPr lang="es-AR" dirty="0"/>
+              <a:t>Análisis dela relevancia de los distintos tipos de demora.</a:t>
+            </a:r>
+          </a:p>
+        </p:txBody>
+      </p:sp>
+    </p:spTree>
+    <p:extLst>
+      <p:ext uri="{BB962C8B-B14F-4D97-AF65-F5344CB8AC3E}">
+        <p14:creationId xmlns:p14="http://schemas.microsoft.com/office/powerpoint/2010/main" val="3290416722"/>
+      </p:ext>
+    </p:extLst>
+  </p:cSld>
+  <p:clrMapOvr>
+    <a:masterClrMapping/>
+  </p:clrMapOvr>
+</p:sld>
+</file>
+
 <file path=ppt/slides/slide2.xml><?xml version="1.0" encoding="utf-8"?>
 <p:sld xmlns:a="http://schemas.openxmlformats.org/drawingml/2006/main" xmlns:r="http://schemas.openxmlformats.org/officeDocument/2006/relationships" xmlns:p="http://schemas.openxmlformats.org/presentationml/2006/main">
   <p:cSld>

</xml_diff>

<commit_message>
Actualizado el power point corrigiendo orden de preguntas
</commit_message>
<xml_diff>
--- a/Análisis Exploratorio de demoras en vuelos de aerolíneas.pptx
+++ b/Análisis Exploratorio de demoras en vuelos de aerolíneas.pptx
@@ -3989,8 +3989,13 @@
           <a:p>
             <a:r>
               <a:rPr lang="es-AR" dirty="0"/>
-              <a:t>Puede predecirse la cantidad de demoras que puede producirse en los vuelos en base a los registros de otras variables registradas:</a:t>
-            </a:r>
+              <a:t>Puede predecirse la cantidad de demoras que puede producirse en los vuelos en base a los registros de otras </a:t>
+            </a:r>
+            <a:r>
+              <a:rPr lang="es-AR"/>
+              <a:t>variables registradas</a:t>
+            </a:r>
+            <a:endParaRPr lang="es-AR" dirty="0"/>
           </a:p>
           <a:p>
             <a:pPr lvl="1"/>
@@ -7525,7 +7530,7 @@
             </a:pPr>
             <a:r>
               <a:rPr lang="es-AR" dirty="0"/>
-              <a:t>¿Cuál es el Carrier con mayor cantidad de vuelos registrados?</a:t>
+              <a:t>¿Cuál es el Carrier con mayor probabilidad de demoras en sus vuelos?</a:t>
             </a:r>
           </a:p>
           <a:p>
@@ -7535,7 +7540,7 @@
             </a:pPr>
             <a:r>
               <a:rPr lang="es-AR" dirty="0"/>
-              <a:t>¿Cuál es el Carrier con mayor cantidad de vuelos registrados con demoras de más de 15 minutos?</a:t>
+              <a:t>¿Cuál es el Carrier con mayor cantidad de vuelos registrados?</a:t>
             </a:r>
           </a:p>
           <a:p>
@@ -7545,7 +7550,7 @@
             </a:pPr>
             <a:r>
               <a:rPr lang="es-AR" dirty="0"/>
-              <a:t>¿Cuál es el Carrier con mayor probabilidad de demoras en sus vuelos?</a:t>
+              <a:t>¿Cuál es el Carrier con mayor cantidad de vuelos registrados con demoras de más de 15 minutos?</a:t>
             </a:r>
           </a:p>
           <a:p>

</xml_diff>